<commit_message>
Added Google Maps API to design review presentation.
</commit_message>
<xml_diff>
--- a/docs/Design review presentation.pptx
+++ b/docs/Design review presentation.pptx
@@ -20,12 +20,11 @@
     <p:sldId id="267" r:id="rId14"/>
     <p:sldId id="268" r:id="rId15"/>
     <p:sldId id="269" r:id="rId16"/>
-    <p:sldId id="270" r:id="rId17"/>
-    <p:sldId id="271" r:id="rId18"/>
-    <p:sldId id="272" r:id="rId19"/>
-    <p:sldId id="273" r:id="rId20"/>
-    <p:sldId id="274" r:id="rId21"/>
-    <p:sldId id="275" r:id="rId22"/>
+    <p:sldId id="271" r:id="rId17"/>
+    <p:sldId id="272" r:id="rId18"/>
+    <p:sldId id="273" r:id="rId19"/>
+    <p:sldId id="274" r:id="rId20"/>
+    <p:sldId id="275" r:id="rId21"/>
   </p:sldIdLst>
   <p:sldSz cx="9144000" cy="6858000" type="screen4x3"/>
   <p:notesSz cx="6858000" cy="9144000"/>
@@ -308,7 +307,7 @@
           <a:p>
             <a:fld id="{1BDCBD17-5CC7-4BD5-907D-58F97F74E9C6}" type="datetimeFigureOut">
               <a:rPr lang="en-US" smtClean="0"/>
-              <a:t>6/29/2013</a:t>
+              <a:t>7/2/2013</a:t>
             </a:fld>
             <a:endParaRPr lang="en-US"/>
           </a:p>
@@ -478,7 +477,7 @@
           <a:p>
             <a:fld id="{1BDCBD17-5CC7-4BD5-907D-58F97F74E9C6}" type="datetimeFigureOut">
               <a:rPr lang="en-US" smtClean="0"/>
-              <a:t>6/29/2013</a:t>
+              <a:t>7/2/2013</a:t>
             </a:fld>
             <a:endParaRPr lang="en-US"/>
           </a:p>
@@ -658,7 +657,7 @@
           <a:p>
             <a:fld id="{1BDCBD17-5CC7-4BD5-907D-58F97F74E9C6}" type="datetimeFigureOut">
               <a:rPr lang="en-US" smtClean="0"/>
-              <a:t>6/29/2013</a:t>
+              <a:t>7/2/2013</a:t>
             </a:fld>
             <a:endParaRPr lang="en-US"/>
           </a:p>
@@ -828,7 +827,7 @@
           <a:p>
             <a:fld id="{1BDCBD17-5CC7-4BD5-907D-58F97F74E9C6}" type="datetimeFigureOut">
               <a:rPr lang="en-US" smtClean="0"/>
-              <a:t>6/29/2013</a:t>
+              <a:t>7/2/2013</a:t>
             </a:fld>
             <a:endParaRPr lang="en-US"/>
           </a:p>
@@ -1074,7 +1073,7 @@
           <a:p>
             <a:fld id="{1BDCBD17-5CC7-4BD5-907D-58F97F74E9C6}" type="datetimeFigureOut">
               <a:rPr lang="en-US" smtClean="0"/>
-              <a:t>6/29/2013</a:t>
+              <a:t>7/2/2013</a:t>
             </a:fld>
             <a:endParaRPr lang="en-US"/>
           </a:p>
@@ -1362,7 +1361,7 @@
           <a:p>
             <a:fld id="{1BDCBD17-5CC7-4BD5-907D-58F97F74E9C6}" type="datetimeFigureOut">
               <a:rPr lang="en-US" smtClean="0"/>
-              <a:t>6/29/2013</a:t>
+              <a:t>7/2/2013</a:t>
             </a:fld>
             <a:endParaRPr lang="en-US"/>
           </a:p>
@@ -1784,7 +1783,7 @@
           <a:p>
             <a:fld id="{1BDCBD17-5CC7-4BD5-907D-58F97F74E9C6}" type="datetimeFigureOut">
               <a:rPr lang="en-US" smtClean="0"/>
-              <a:t>6/29/2013</a:t>
+              <a:t>7/2/2013</a:t>
             </a:fld>
             <a:endParaRPr lang="en-US"/>
           </a:p>
@@ -1902,7 +1901,7 @@
           <a:p>
             <a:fld id="{1BDCBD17-5CC7-4BD5-907D-58F97F74E9C6}" type="datetimeFigureOut">
               <a:rPr lang="en-US" smtClean="0"/>
-              <a:t>6/29/2013</a:t>
+              <a:t>7/2/2013</a:t>
             </a:fld>
             <a:endParaRPr lang="en-US"/>
           </a:p>
@@ -1997,7 +1996,7 @@
           <a:p>
             <a:fld id="{1BDCBD17-5CC7-4BD5-907D-58F97F74E9C6}" type="datetimeFigureOut">
               <a:rPr lang="en-US" smtClean="0"/>
-              <a:t>6/29/2013</a:t>
+              <a:t>7/2/2013</a:t>
             </a:fld>
             <a:endParaRPr lang="en-US"/>
           </a:p>
@@ -2274,7 +2273,7 @@
           <a:p>
             <a:fld id="{1BDCBD17-5CC7-4BD5-907D-58F97F74E9C6}" type="datetimeFigureOut">
               <a:rPr lang="en-US" smtClean="0"/>
-              <a:t>6/29/2013</a:t>
+              <a:t>7/2/2013</a:t>
             </a:fld>
             <a:endParaRPr lang="en-US"/>
           </a:p>
@@ -2527,7 +2526,7 @@
           <a:p>
             <a:fld id="{1BDCBD17-5CC7-4BD5-907D-58F97F74E9C6}" type="datetimeFigureOut">
               <a:rPr lang="en-US" smtClean="0"/>
-              <a:t>6/29/2013</a:t>
+              <a:t>7/2/2013</a:t>
             </a:fld>
             <a:endParaRPr lang="en-US"/>
           </a:p>
@@ -2740,7 +2739,7 @@
           <a:p>
             <a:fld id="{1BDCBD17-5CC7-4BD5-907D-58F97F74E9C6}" type="datetimeFigureOut">
               <a:rPr lang="en-US" smtClean="0"/>
-              <a:t>6/29/2013</a:t>
+              <a:t>7/2/2013</a:t>
             </a:fld>
             <a:endParaRPr lang="en-US"/>
           </a:p>
@@ -3171,6 +3170,13 @@
   <p:clrMapOvr>
     <a:masterClrMapping/>
   </p:clrMapOvr>
+  <p:timing>
+    <p:tnLst>
+      <p:par>
+        <p:cTn id="1" dur="indefinite" restart="never" nodeType="tmRoot"/>
+      </p:par>
+    </p:tnLst>
+  </p:timing>
 </p:sld>
 </file>
 
@@ -3327,6 +3333,13 @@
   <p:clrMapOvr>
     <a:masterClrMapping/>
   </p:clrMapOvr>
+  <p:timing>
+    <p:tnLst>
+      <p:par>
+        <p:cTn id="1" dur="indefinite" restart="never" nodeType="tmRoot"/>
+      </p:par>
+    </p:tnLst>
+  </p:timing>
 </p:sld>
 </file>
 
@@ -3974,6 +3987,13 @@
   <p:clrMapOvr>
     <a:masterClrMapping/>
   </p:clrMapOvr>
+  <p:timing>
+    <p:tnLst>
+      <p:par>
+        <p:cTn id="1" dur="indefinite" restart="never" nodeType="tmRoot"/>
+      </p:par>
+    </p:tnLst>
+  </p:timing>
 </p:sld>
 </file>
 
@@ -3994,6 +4014,69 @@
           <a:chExt cx="0" cy="0"/>
         </a:xfrm>
       </p:grpSpPr>
+      <p:pic>
+        <p:nvPicPr>
+          <p:cNvPr id="1030" name="Picture 6"/>
+          <p:cNvPicPr>
+            <a:picLocks noChangeAspect="1" noChangeArrowheads="1"/>
+          </p:cNvPicPr>
+          <p:nvPr/>
+        </p:nvPicPr>
+        <p:blipFill>
+          <a:blip r:embed="rId2">
+            <a:extLst>
+              <a:ext uri="{BEBA8EAE-BF5A-486C-A8C5-ECC9F3942E4B}">
+                <a14:imgProps xmlns:a14="http://schemas.microsoft.com/office/drawing/2010/main">
+                  <a14:imgLayer r:embed="rId3">
+                    <a14:imgEffect>
+                      <a14:sharpenSoften amount="-32000"/>
+                    </a14:imgEffect>
+                  </a14:imgLayer>
+                </a14:imgProps>
+              </a:ext>
+              <a:ext uri="{28A0092B-C50C-407E-A947-70E740481C1C}">
+                <a14:useLocalDpi xmlns:a14="http://schemas.microsoft.com/office/drawing/2010/main" val="0"/>
+              </a:ext>
+            </a:extLst>
+          </a:blip>
+          <a:srcRect/>
+          <a:stretch>
+            <a:fillRect/>
+          </a:stretch>
+        </p:blipFill>
+        <p:spPr bwMode="auto">
+          <a:xfrm>
+            <a:off x="0" y="0"/>
+            <a:ext cx="9144000" cy="6858000"/>
+          </a:xfrm>
+          <a:prstGeom prst="rect">
+            <a:avLst/>
+          </a:prstGeom>
+          <a:noFill/>
+          <a:ln>
+            <a:noFill/>
+          </a:ln>
+          <a:extLst>
+            <a:ext uri="{909E8E84-426E-40DD-AFC4-6F175D3DCCD1}">
+              <a14:hiddenFill xmlns:a14="http://schemas.microsoft.com/office/drawing/2010/main">
+                <a:solidFill>
+                  <a:schemeClr val="accent1"/>
+                </a:solidFill>
+              </a14:hiddenFill>
+            </a:ext>
+            <a:ext uri="{91240B29-F687-4F45-9708-019B960494DF}">
+              <a14:hiddenLine xmlns:a14="http://schemas.microsoft.com/office/drawing/2010/main" w="9525">
+                <a:solidFill>
+                  <a:schemeClr val="tx1"/>
+                </a:solidFill>
+                <a:miter lim="800000"/>
+                <a:headEnd/>
+                <a:tailEnd/>
+              </a14:hiddenLine>
+            </a:ext>
+          </a:extLst>
+        </p:spPr>
+      </p:pic>
       <p:sp>
         <p:nvSpPr>
           <p:cNvPr id="2" name="Title 1"/>
@@ -4010,10 +4093,22 @@
           <a:lstStyle/>
           <a:p>
             <a:r>
-              <a:rPr lang="en-US" dirty="0" smtClean="0"/>
+              <a:rPr lang="en-US" dirty="0" smtClean="0">
+                <a:ln>
+                  <a:solidFill>
+                    <a:schemeClr val="tx1"/>
+                  </a:solidFill>
+                </a:ln>
+              </a:rPr>
               <a:t>Google Maps API</a:t>
             </a:r>
-            <a:endParaRPr lang="en-US" dirty="0"/>
+            <a:endParaRPr lang="en-US" dirty="0">
+              <a:ln>
+                <a:solidFill>
+                  <a:schemeClr val="tx1"/>
+                </a:solidFill>
+              </a:ln>
+            </a:endParaRPr>
           </a:p>
         </p:txBody>
       </p:sp>
@@ -4032,7 +4127,55 @@
           <a:bodyPr/>
           <a:lstStyle/>
           <a:p>
-            <a:endParaRPr lang="en-US"/>
+            <a:r>
+              <a:rPr lang="en-US" dirty="0" smtClean="0">
+                <a:ln w="12700">
+                  <a:solidFill>
+                    <a:schemeClr val="tx1"/>
+                  </a:solidFill>
+                </a:ln>
+                <a:latin typeface="Arial" pitchFamily="34" charset="0"/>
+                <a:cs typeface="Arial" pitchFamily="34" charset="0"/>
+              </a:rPr>
+              <a:t>Part of the Google Play Services SDK (Separate download from Android SDK)</a:t>
+            </a:r>
+          </a:p>
+          <a:p>
+            <a:r>
+              <a:rPr lang="en-US" dirty="0" smtClean="0">
+                <a:ln w="12700">
+                  <a:solidFill>
+                    <a:schemeClr val="tx1"/>
+                  </a:solidFill>
+                </a:ln>
+                <a:latin typeface="Arial" pitchFamily="34" charset="0"/>
+                <a:cs typeface="Arial" pitchFamily="34" charset="0"/>
+              </a:rPr>
+              <a:t>Allows you to place and interface with maps inside your app</a:t>
+            </a:r>
+          </a:p>
+          <a:p>
+            <a:r>
+              <a:rPr lang="en-US" dirty="0" smtClean="0">
+                <a:ln w="12700">
+                  <a:solidFill>
+                    <a:schemeClr val="tx1"/>
+                  </a:solidFill>
+                </a:ln>
+                <a:latin typeface="Arial" pitchFamily="34" charset="0"/>
+                <a:cs typeface="Arial" pitchFamily="34" charset="0"/>
+              </a:rPr>
+              <a:t>Requires one-time app registration to access Google’s servers</a:t>
+            </a:r>
+            <a:endParaRPr lang="en-US" dirty="0">
+              <a:ln w="12700">
+                <a:solidFill>
+                  <a:schemeClr val="tx1"/>
+                </a:solidFill>
+              </a:ln>
+              <a:latin typeface="Arial" pitchFamily="34" charset="0"/>
+              <a:cs typeface="Arial" pitchFamily="34" charset="0"/>
+            </a:endParaRPr>
           </a:p>
         </p:txBody>
       </p:sp>
@@ -4046,6 +4189,13 @@
   <p:clrMapOvr>
     <a:masterClrMapping/>
   </p:clrMapOvr>
+  <p:timing>
+    <p:tnLst>
+      <p:par>
+        <p:cTn id="1" dur="indefinite" restart="never" nodeType="tmRoot"/>
+      </p:par>
+    </p:tnLst>
+  </p:timing>
 </p:sld>
 </file>
 
@@ -4083,7 +4233,7 @@
           <a:p>
             <a:r>
               <a:rPr lang="en-US" dirty="0" smtClean="0"/>
-              <a:t>Google Maps API</a:t>
+              <a:t>Setting up the Maps API</a:t>
             </a:r>
             <a:endParaRPr lang="en-US" dirty="0"/>
           </a:p>
@@ -4104,7 +4254,133 @@
           <a:bodyPr/>
           <a:lstStyle/>
           <a:p>
-            <a:endParaRPr lang="en-US"/>
+            <a:pPr marL="514350" indent="-514350">
+              <a:buAutoNum type="arabicPeriod"/>
+            </a:pPr>
+            <a:r>
+              <a:rPr lang="en-US" dirty="0" smtClean="0"/>
+              <a:t>Obtain your application’s digital certificate (SHA-1 fingerprint)</a:t>
+            </a:r>
+          </a:p>
+          <a:p>
+            <a:pPr marL="514350" indent="-514350">
+              <a:buAutoNum type="arabicPeriod"/>
+            </a:pPr>
+            <a:r>
+              <a:rPr lang="en-US" dirty="0" smtClean="0"/>
+              <a:t>Register your app on the Google APIs website</a:t>
+            </a:r>
+          </a:p>
+          <a:p>
+            <a:pPr marL="514350" indent="-514350">
+              <a:buAutoNum type="arabicPeriod"/>
+            </a:pPr>
+            <a:r>
+              <a:rPr lang="en-US" dirty="0" smtClean="0"/>
+              <a:t>Create a new Android Key</a:t>
+            </a:r>
+          </a:p>
+          <a:p>
+            <a:pPr marL="514350" indent="-514350">
+              <a:buAutoNum type="arabicPeriod"/>
+            </a:pPr>
+            <a:r>
+              <a:rPr lang="en-US" dirty="0" smtClean="0"/>
+              <a:t>Import the Android Key into your application</a:t>
+            </a:r>
+          </a:p>
+          <a:p>
+            <a:pPr marL="514350" indent="-514350">
+              <a:buAutoNum type="arabicPeriod"/>
+            </a:pPr>
+            <a:r>
+              <a:rPr lang="en-US" dirty="0" smtClean="0"/>
+              <a:t>Enable Google Maps Android API v2 under “API Access” in your Google API account.</a:t>
+            </a:r>
+            <a:endParaRPr lang="en-US" dirty="0"/>
+          </a:p>
+        </p:txBody>
+      </p:sp>
+      <p:pic>
+        <p:nvPicPr>
+          <p:cNvPr id="2050" name="Picture 2"/>
+          <p:cNvPicPr>
+            <a:picLocks noChangeAspect="1" noChangeArrowheads="1"/>
+          </p:cNvPicPr>
+          <p:nvPr/>
+        </p:nvPicPr>
+        <p:blipFill>
+          <a:blip r:embed="rId2">
+            <a:extLst>
+              <a:ext uri="{28A0092B-C50C-407E-A947-70E740481C1C}">
+                <a14:useLocalDpi xmlns:a14="http://schemas.microsoft.com/office/drawing/2010/main" val="0"/>
+              </a:ext>
+            </a:extLst>
+          </a:blip>
+          <a:srcRect/>
+          <a:stretch>
+            <a:fillRect/>
+          </a:stretch>
+        </p:blipFill>
+        <p:spPr bwMode="auto">
+          <a:xfrm>
+            <a:off x="561975" y="5619750"/>
+            <a:ext cx="8020050" cy="476250"/>
+          </a:xfrm>
+          <a:prstGeom prst="rect">
+            <a:avLst/>
+          </a:prstGeom>
+          <a:noFill/>
+          <a:ln>
+            <a:noFill/>
+          </a:ln>
+          <a:extLst>
+            <a:ext uri="{909E8E84-426E-40DD-AFC4-6F175D3DCCD1}">
+              <a14:hiddenFill xmlns:a14="http://schemas.microsoft.com/office/drawing/2010/main">
+                <a:solidFill>
+                  <a:schemeClr val="accent1"/>
+                </a:solidFill>
+              </a14:hiddenFill>
+            </a:ext>
+            <a:ext uri="{91240B29-F687-4F45-9708-019B960494DF}">
+              <a14:hiddenLine xmlns:a14="http://schemas.microsoft.com/office/drawing/2010/main" w="9525">
+                <a:solidFill>
+                  <a:schemeClr val="tx1"/>
+                </a:solidFill>
+                <a:miter lim="800000"/>
+                <a:headEnd/>
+                <a:tailEnd/>
+              </a14:hiddenLine>
+            </a:ext>
+          </a:extLst>
+        </p:spPr>
+      </p:pic>
+      <p:sp>
+        <p:nvSpPr>
+          <p:cNvPr id="4" name="TextBox 3"/>
+          <p:cNvSpPr txBox="1"/>
+          <p:nvPr/>
+        </p:nvSpPr>
+        <p:spPr>
+          <a:xfrm>
+            <a:off x="561975" y="6248400"/>
+            <a:ext cx="6538200" cy="369332"/>
+          </a:xfrm>
+          <a:prstGeom prst="rect">
+            <a:avLst/>
+          </a:prstGeom>
+          <a:noFill/>
+        </p:spPr>
+        <p:txBody>
+          <a:bodyPr wrap="none" rtlCol="0">
+            <a:spAutoFit/>
+          </a:bodyPr>
+          <a:lstStyle/>
+          <a:p>
+            <a:r>
+              <a:rPr lang="en-US" dirty="0"/>
+              <a:t>https://developers.google.com/maps/documentation/android/start</a:t>
+            </a:r>
           </a:p>
         </p:txBody>
       </p:sp>
@@ -4118,6 +4394,13 @@
   <p:clrMapOvr>
     <a:masterClrMapping/>
   </p:clrMapOvr>
+  <p:timing>
+    <p:tnLst>
+      <p:par>
+        <p:cTn id="1" dur="indefinite" restart="never" nodeType="tmRoot"/>
+      </p:par>
+    </p:tnLst>
+  </p:timing>
 </p:sld>
 </file>
 
@@ -4154,28 +4437,114 @@
           <a:lstStyle/>
           <a:p>
             <a:r>
+              <a:rPr lang="en-US" dirty="0" smtClean="0"/>
+              <a:t>Using Maps in an App</a:t>
+            </a:r>
+            <a:endParaRPr lang="en-US" dirty="0"/>
+          </a:p>
+        </p:txBody>
+      </p:sp>
+      <p:sp>
+        <p:nvSpPr>
+          <p:cNvPr id="3" name="Content Placeholder 2"/>
+          <p:cNvSpPr>
+            <a:spLocks noGrp="1"/>
+          </p:cNvSpPr>
+          <p:nvPr>
+            <p:ph idx="1"/>
+          </p:nvPr>
+        </p:nvSpPr>
+        <p:spPr/>
+        <p:txBody>
+          <a:bodyPr/>
+          <a:lstStyle/>
+          <a:p>
+            <a:r>
+              <a:rPr lang="en-US" dirty="0" smtClean="0"/>
+              <a:t>The easiest way to add a map to an Activity is by adding a </a:t>
+            </a:r>
+            <a:r>
+              <a:rPr lang="en-US" dirty="0" err="1" smtClean="0"/>
+              <a:t>MapFragment</a:t>
+            </a:r>
+            <a:r>
+              <a:rPr lang="en-US" dirty="0" smtClean="0"/>
+              <a:t> to the layout xml file.</a:t>
+            </a:r>
+          </a:p>
+          <a:p>
+            <a:r>
+              <a:rPr lang="en-US" dirty="0" smtClean="0"/>
+              <a:t>Then, in code, use the </a:t>
+            </a:r>
+            <a:r>
+              <a:rPr lang="en-US" dirty="0" err="1" smtClean="0"/>
+              <a:t>getMap</a:t>
+            </a:r>
+            <a:r>
+              <a:rPr lang="en-US" dirty="0" smtClean="0"/>
+              <a:t>() method to obtain the </a:t>
+            </a:r>
+            <a:r>
+              <a:rPr lang="en-US" dirty="0" err="1" smtClean="0"/>
+              <a:t>GoogleMap</a:t>
+            </a:r>
+            <a:r>
+              <a:rPr lang="en-US" dirty="0" smtClean="0"/>
+              <a:t> object for the </a:t>
+            </a:r>
+            <a:r>
+              <a:rPr lang="en-US" dirty="0" err="1" smtClean="0"/>
+              <a:t>MapFragment</a:t>
+            </a:r>
+            <a:r>
+              <a:rPr lang="en-US" dirty="0" smtClean="0"/>
+              <a:t>.</a:t>
+            </a:r>
+          </a:p>
+          <a:p>
+            <a:r>
+              <a:rPr lang="en-US" dirty="0" smtClean="0"/>
+              <a:t>The </a:t>
+            </a:r>
+            <a:r>
+              <a:rPr lang="en-US" dirty="0" err="1" smtClean="0"/>
+              <a:t>GoogleMap</a:t>
+            </a:r>
+            <a:r>
+              <a:rPr lang="en-US" dirty="0" smtClean="0"/>
+              <a:t> object has methods that will allow you to customize the shown map</a:t>
+            </a:r>
+            <a:endParaRPr lang="en-US" dirty="0"/>
+          </a:p>
+        </p:txBody>
+      </p:sp>
+      <p:sp>
+        <p:nvSpPr>
+          <p:cNvPr id="4" name="TextBox 3"/>
+          <p:cNvSpPr txBox="1"/>
+          <p:nvPr/>
+        </p:nvSpPr>
+        <p:spPr>
+          <a:xfrm>
+            <a:off x="533400" y="6260068"/>
+            <a:ext cx="6530377" cy="369332"/>
+          </a:xfrm>
+          <a:prstGeom prst="rect">
+            <a:avLst/>
+          </a:prstGeom>
+          <a:noFill/>
+        </p:spPr>
+        <p:txBody>
+          <a:bodyPr wrap="none" rtlCol="0">
+            <a:spAutoFit/>
+          </a:bodyPr>
+          <a:lstStyle/>
+          <a:p>
+            <a:r>
               <a:rPr lang="en-US" dirty="0"/>
-              <a:t>Google Maps API</a:t>
-            </a:r>
-          </a:p>
-        </p:txBody>
-      </p:sp>
-      <p:sp>
-        <p:nvSpPr>
-          <p:cNvPr id="3" name="Content Placeholder 2"/>
-          <p:cNvSpPr>
-            <a:spLocks noGrp="1"/>
-          </p:cNvSpPr>
-          <p:nvPr>
-            <p:ph idx="1"/>
-          </p:nvPr>
-        </p:nvSpPr>
-        <p:spPr/>
-        <p:txBody>
-          <a:bodyPr/>
-          <a:lstStyle/>
-          <a:p>
-            <a:endParaRPr lang="en-US"/>
+              <a:t>https://developers.google.com/maps/documentation/android/map</a:t>
+            </a:r>
           </a:p>
         </p:txBody>
       </p:sp>
@@ -4189,6 +4558,13 @@
   <p:clrMapOvr>
     <a:masterClrMapping/>
   </p:clrMapOvr>
+  <p:timing>
+    <p:tnLst>
+      <p:par>
+        <p:cTn id="1" dur="indefinite" restart="never" nodeType="tmRoot"/>
+      </p:par>
+    </p:tnLst>
+  </p:timing>
 </p:sld>
 </file>
 
@@ -4225,9 +4601,18 @@
           <a:lstStyle/>
           <a:p>
             <a:r>
-              <a:rPr lang="en-US" dirty="0"/>
-              <a:t>Google Maps API</a:t>
-            </a:r>
+              <a:rPr lang="en-US" dirty="0" smtClean="0"/>
+              <a:t>Common </a:t>
+            </a:r>
+            <a:r>
+              <a:rPr lang="en-US" dirty="0" err="1" smtClean="0"/>
+              <a:t>GoogleMap</a:t>
+            </a:r>
+            <a:r>
+              <a:rPr lang="en-US" dirty="0" smtClean="0"/>
+              <a:t> Methods</a:t>
+            </a:r>
+            <a:endParaRPr lang="en-US" dirty="0"/>
           </a:p>
         </p:txBody>
       </p:sp>
@@ -4246,7 +4631,53 @@
           <a:bodyPr/>
           <a:lstStyle/>
           <a:p>
-            <a:endParaRPr lang="en-US"/>
+            <a:r>
+              <a:rPr lang="en-US" dirty="0" err="1" smtClean="0"/>
+              <a:t>setMapType</a:t>
+            </a:r>
+            <a:r>
+              <a:rPr lang="en-US" dirty="0" smtClean="0"/>
+              <a:t>() – change the type of the map displayed – normal, satellite, hybrid, or terrain</a:t>
+            </a:r>
+          </a:p>
+          <a:p>
+            <a:r>
+              <a:rPr lang="en-US" dirty="0" err="1" smtClean="0"/>
+              <a:t>addMarker</a:t>
+            </a:r>
+            <a:r>
+              <a:rPr lang="en-US" dirty="0" smtClean="0"/>
+              <a:t>() – add a marker on the map at a given latitude and longitude</a:t>
+            </a:r>
+          </a:p>
+          <a:p>
+            <a:r>
+              <a:rPr lang="en-US" dirty="0" err="1" smtClean="0"/>
+              <a:t>addPolyLine</a:t>
+            </a:r>
+            <a:r>
+              <a:rPr lang="en-US" dirty="0" smtClean="0"/>
+              <a:t>(), </a:t>
+            </a:r>
+            <a:r>
+              <a:rPr lang="en-US" dirty="0" err="1" smtClean="0"/>
+              <a:t>addPolygon</a:t>
+            </a:r>
+            <a:r>
+              <a:rPr lang="en-US" dirty="0" smtClean="0"/>
+              <a:t>, </a:t>
+            </a:r>
+            <a:r>
+              <a:rPr lang="en-US" dirty="0" err="1" smtClean="0"/>
+              <a:t>addCircle</a:t>
+            </a:r>
+            <a:r>
+              <a:rPr lang="en-US" dirty="0" smtClean="0"/>
+              <a:t>() – draw on the map</a:t>
+            </a:r>
+          </a:p>
+          <a:p>
+            <a:endParaRPr lang="en-US" dirty="0"/>
           </a:p>
         </p:txBody>
       </p:sp>
@@ -4296,9 +4727,10 @@
           <a:lstStyle/>
           <a:p>
             <a:r>
-              <a:rPr lang="en-US" dirty="0"/>
-              <a:t>Google Maps API</a:t>
-            </a:r>
+              <a:rPr lang="en-US" dirty="0" smtClean="0"/>
+              <a:t>Flyweight - Design Pattern</a:t>
+            </a:r>
+            <a:endParaRPr lang="en-US" dirty="0"/>
           </a:p>
         </p:txBody>
       </p:sp>
@@ -4314,17 +4746,55 @@
         </p:nvSpPr>
         <p:spPr/>
         <p:txBody>
-          <a:bodyPr/>
-          <a:lstStyle/>
-          <a:p>
-            <a:endParaRPr lang="en-US"/>
+          <a:bodyPr>
+            <a:normAutofit lnSpcReduction="10000"/>
+          </a:bodyPr>
+          <a:lstStyle/>
+          <a:p>
+            <a:r>
+              <a:rPr lang="en-US" dirty="0" smtClean="0"/>
+              <a:t>Purpose – Structural</a:t>
+            </a:r>
+          </a:p>
+          <a:p>
+            <a:r>
+              <a:rPr lang="en-US" dirty="0" smtClean="0"/>
+              <a:t>Scope – Object </a:t>
+            </a:r>
+          </a:p>
+          <a:p>
+            <a:r>
+              <a:rPr lang="en-US" dirty="0" smtClean="0"/>
+              <a:t>Motivation</a:t>
+            </a:r>
+          </a:p>
+          <a:p>
+            <a:pPr lvl="1"/>
+            <a:r>
+              <a:rPr lang="en-US" dirty="0" smtClean="0"/>
+              <a:t>Sometimes, programs need multiple objects that have some similarities, This can cause a large memory cost</a:t>
+            </a:r>
+          </a:p>
+          <a:p>
+            <a:r>
+              <a:rPr lang="en-US" dirty="0" smtClean="0"/>
+              <a:t>Intent</a:t>
+            </a:r>
+          </a:p>
+          <a:p>
+            <a:pPr lvl="1"/>
+            <a:r>
+              <a:rPr lang="en-US" dirty="0" smtClean="0"/>
+              <a:t>Use sharing to have a large number of objects that share an internal state with the rest varying</a:t>
+            </a:r>
+            <a:endParaRPr lang="en-US" dirty="0"/>
           </a:p>
         </p:txBody>
       </p:sp>
     </p:spTree>
     <p:extLst>
       <p:ext uri="{BB962C8B-B14F-4D97-AF65-F5344CB8AC3E}">
-        <p14:creationId xmlns:p14="http://schemas.microsoft.com/office/powerpoint/2010/main" val="1717448519"/>
+        <p14:creationId xmlns:p14="http://schemas.microsoft.com/office/powerpoint/2010/main" val="719817041"/>
       </p:ext>
     </p:extLst>
   </p:cSld>
@@ -4368,116 +4838,6 @@
           <a:p>
             <a:r>
               <a:rPr lang="en-US" dirty="0" smtClean="0"/>
-              <a:t>Flyweight - Design Pattern</a:t>
-            </a:r>
-            <a:endParaRPr lang="en-US" dirty="0"/>
-          </a:p>
-        </p:txBody>
-      </p:sp>
-      <p:sp>
-        <p:nvSpPr>
-          <p:cNvPr id="3" name="Content Placeholder 2"/>
-          <p:cNvSpPr>
-            <a:spLocks noGrp="1"/>
-          </p:cNvSpPr>
-          <p:nvPr>
-            <p:ph idx="1"/>
-          </p:nvPr>
-        </p:nvSpPr>
-        <p:spPr/>
-        <p:txBody>
-          <a:bodyPr>
-            <a:normAutofit lnSpcReduction="10000"/>
-          </a:bodyPr>
-          <a:lstStyle/>
-          <a:p>
-            <a:r>
-              <a:rPr lang="en-US" dirty="0" smtClean="0"/>
-              <a:t>Purpose – Structural</a:t>
-            </a:r>
-          </a:p>
-          <a:p>
-            <a:r>
-              <a:rPr lang="en-US" dirty="0" smtClean="0"/>
-              <a:t>Scope – Object </a:t>
-            </a:r>
-          </a:p>
-          <a:p>
-            <a:r>
-              <a:rPr lang="en-US" dirty="0" smtClean="0"/>
-              <a:t>Motivation</a:t>
-            </a:r>
-          </a:p>
-          <a:p>
-            <a:pPr lvl="1"/>
-            <a:r>
-              <a:rPr lang="en-US" dirty="0" smtClean="0"/>
-              <a:t>Sometimes, programs need multiple objects that have some similarities, This can cause a large memory cost</a:t>
-            </a:r>
-          </a:p>
-          <a:p>
-            <a:r>
-              <a:rPr lang="en-US" dirty="0" smtClean="0"/>
-              <a:t>Intent</a:t>
-            </a:r>
-          </a:p>
-          <a:p>
-            <a:pPr lvl="1"/>
-            <a:r>
-              <a:rPr lang="en-US" dirty="0" smtClean="0"/>
-              <a:t>Use sharing to have a large number of objects that share an internal state with the rest varying</a:t>
-            </a:r>
-            <a:endParaRPr lang="en-US" dirty="0"/>
-          </a:p>
-        </p:txBody>
-      </p:sp>
-    </p:spTree>
-    <p:extLst>
-      <p:ext uri="{BB962C8B-B14F-4D97-AF65-F5344CB8AC3E}">
-        <p14:creationId xmlns:p14="http://schemas.microsoft.com/office/powerpoint/2010/main" val="719817041"/>
-      </p:ext>
-    </p:extLst>
-  </p:cSld>
-  <p:clrMapOvr>
-    <a:masterClrMapping/>
-  </p:clrMapOvr>
-</p:sld>
-</file>
-
-<file path=ppt/slides/slide18.xml><?xml version="1.0" encoding="utf-8"?>
-<p:sld xmlns:a="http://schemas.openxmlformats.org/drawingml/2006/main" xmlns:r="http://schemas.openxmlformats.org/officeDocument/2006/relationships" xmlns:p="http://schemas.openxmlformats.org/presentationml/2006/main">
-  <p:cSld>
-    <p:spTree>
-      <p:nvGrpSpPr>
-        <p:cNvPr id="1" name=""/>
-        <p:cNvGrpSpPr/>
-        <p:nvPr/>
-      </p:nvGrpSpPr>
-      <p:grpSpPr>
-        <a:xfrm>
-          <a:off x="0" y="0"/>
-          <a:ext cx="0" cy="0"/>
-          <a:chOff x="0" y="0"/>
-          <a:chExt cx="0" cy="0"/>
-        </a:xfrm>
-      </p:grpSpPr>
-      <p:sp>
-        <p:nvSpPr>
-          <p:cNvPr id="2" name="Title 1"/>
-          <p:cNvSpPr>
-            <a:spLocks noGrp="1"/>
-          </p:cNvSpPr>
-          <p:nvPr>
-            <p:ph type="title"/>
-          </p:nvPr>
-        </p:nvSpPr>
-        <p:spPr/>
-        <p:txBody>
-          <a:bodyPr/>
-          <a:lstStyle/>
-          <a:p>
-            <a:r>
-              <a:rPr lang="en-US" dirty="0" smtClean="0"/>
               <a:t>Flyweight - Participants</a:t>
             </a:r>
             <a:endParaRPr lang="en-US" dirty="0"/>
@@ -4577,7 +4937,7 @@
 </p:sld>
 </file>
 
-<file path=ppt/slides/slide19.xml><?xml version="1.0" encoding="utf-8"?>
+<file path=ppt/slides/slide18.xml><?xml version="1.0" encoding="utf-8"?>
 <p:sld xmlns:a="http://schemas.openxmlformats.org/drawingml/2006/main" xmlns:r="http://schemas.openxmlformats.org/officeDocument/2006/relationships" xmlns:p="http://schemas.openxmlformats.org/presentationml/2006/main">
   <p:cSld>
     <p:spTree>
@@ -4659,6 +5019,109 @@
 </p:sld>
 </file>
 
+<file path=ppt/slides/slide19.xml><?xml version="1.0" encoding="utf-8"?>
+<p:sld xmlns:a="http://schemas.openxmlformats.org/drawingml/2006/main" xmlns:r="http://schemas.openxmlformats.org/officeDocument/2006/relationships" xmlns:p="http://schemas.openxmlformats.org/presentationml/2006/main">
+  <p:cSld>
+    <p:spTree>
+      <p:nvGrpSpPr>
+        <p:cNvPr id="1" name=""/>
+        <p:cNvGrpSpPr/>
+        <p:nvPr/>
+      </p:nvGrpSpPr>
+      <p:grpSpPr>
+        <a:xfrm>
+          <a:off x="0" y="0"/>
+          <a:ext cx="0" cy="0"/>
+          <a:chOff x="0" y="0"/>
+          <a:chExt cx="0" cy="0"/>
+        </a:xfrm>
+      </p:grpSpPr>
+      <p:sp>
+        <p:nvSpPr>
+          <p:cNvPr id="2" name="Title 1"/>
+          <p:cNvSpPr>
+            <a:spLocks noGrp="1"/>
+          </p:cNvSpPr>
+          <p:nvPr>
+            <p:ph type="title"/>
+          </p:nvPr>
+        </p:nvSpPr>
+        <p:spPr/>
+        <p:txBody>
+          <a:bodyPr/>
+          <a:lstStyle/>
+          <a:p>
+            <a:r>
+              <a:rPr lang="en-US" dirty="0" smtClean="0"/>
+              <a:t>Flyweight - Implementation</a:t>
+            </a:r>
+            <a:endParaRPr lang="en-US" dirty="0"/>
+          </a:p>
+        </p:txBody>
+      </p:sp>
+      <p:sp>
+        <p:nvSpPr>
+          <p:cNvPr id="3" name="Content Placeholder 2"/>
+          <p:cNvSpPr>
+            <a:spLocks noGrp="1"/>
+          </p:cNvSpPr>
+          <p:nvPr>
+            <p:ph idx="1"/>
+          </p:nvPr>
+        </p:nvSpPr>
+        <p:spPr/>
+        <p:txBody>
+          <a:bodyPr/>
+          <a:lstStyle/>
+          <a:p>
+            <a:r>
+              <a:rPr lang="en-US" dirty="0" smtClean="0"/>
+              <a:t>Client calls factory to get flyweight object</a:t>
+            </a:r>
+          </a:p>
+          <a:p>
+            <a:r>
+              <a:rPr lang="en-US" dirty="0" smtClean="0"/>
+              <a:t>Factory checks pool to determine if object exists</a:t>
+            </a:r>
+          </a:p>
+          <a:p>
+            <a:pPr lvl="1"/>
+            <a:r>
+              <a:rPr lang="en-US" dirty="0" smtClean="0"/>
+              <a:t>If so factor returns object</a:t>
+            </a:r>
+          </a:p>
+          <a:p>
+            <a:pPr lvl="1"/>
+            <a:r>
+              <a:rPr lang="en-US" dirty="0" smtClean="0"/>
+              <a:t>Otherwise factory creates object adds it to the pool and returns it</a:t>
+            </a:r>
+          </a:p>
+          <a:p>
+            <a:pPr lvl="1"/>
+            <a:r>
+              <a:rPr lang="en-US" dirty="0" smtClean="0"/>
+              <a:t>Flyweight maintains shared internal state and provides methods to manipulate varying external state </a:t>
+            </a:r>
+            <a:endParaRPr lang="en-US" dirty="0"/>
+          </a:p>
+        </p:txBody>
+      </p:sp>
+    </p:spTree>
+    <p:extLst>
+      <p:ext uri="{BB962C8B-B14F-4D97-AF65-F5344CB8AC3E}">
+        <p14:creationId xmlns:p14="http://schemas.microsoft.com/office/powerpoint/2010/main" val="1716789449"/>
+      </p:ext>
+    </p:extLst>
+  </p:cSld>
+  <p:clrMapOvr>
+    <a:masterClrMapping/>
+  </p:clrMapOvr>
+</p:sld>
+</file>
+
 <file path=ppt/slides/slide2.xml><?xml version="1.0" encoding="utf-8"?>
 <p:sld xmlns:a="http://schemas.openxmlformats.org/drawingml/2006/main" xmlns:r="http://schemas.openxmlformats.org/officeDocument/2006/relationships" xmlns:p="http://schemas.openxmlformats.org/presentationml/2006/main">
   <p:cSld>
@@ -4796,113 +5259,17 @@
   <p:clrMapOvr>
     <a:masterClrMapping/>
   </p:clrMapOvr>
+  <p:timing>
+    <p:tnLst>
+      <p:par>
+        <p:cTn id="1" dur="indefinite" restart="never" nodeType="tmRoot"/>
+      </p:par>
+    </p:tnLst>
+  </p:timing>
 </p:sld>
 </file>
 
 <file path=ppt/slides/slide20.xml><?xml version="1.0" encoding="utf-8"?>
-<p:sld xmlns:a="http://schemas.openxmlformats.org/drawingml/2006/main" xmlns:r="http://schemas.openxmlformats.org/officeDocument/2006/relationships" xmlns:p="http://schemas.openxmlformats.org/presentationml/2006/main">
-  <p:cSld>
-    <p:spTree>
-      <p:nvGrpSpPr>
-        <p:cNvPr id="1" name=""/>
-        <p:cNvGrpSpPr/>
-        <p:nvPr/>
-      </p:nvGrpSpPr>
-      <p:grpSpPr>
-        <a:xfrm>
-          <a:off x="0" y="0"/>
-          <a:ext cx="0" cy="0"/>
-          <a:chOff x="0" y="0"/>
-          <a:chExt cx="0" cy="0"/>
-        </a:xfrm>
-      </p:grpSpPr>
-      <p:sp>
-        <p:nvSpPr>
-          <p:cNvPr id="2" name="Title 1"/>
-          <p:cNvSpPr>
-            <a:spLocks noGrp="1"/>
-          </p:cNvSpPr>
-          <p:nvPr>
-            <p:ph type="title"/>
-          </p:nvPr>
-        </p:nvSpPr>
-        <p:spPr/>
-        <p:txBody>
-          <a:bodyPr/>
-          <a:lstStyle/>
-          <a:p>
-            <a:r>
-              <a:rPr lang="en-US" dirty="0" smtClean="0"/>
-              <a:t>Flyweight - Implementation</a:t>
-            </a:r>
-            <a:endParaRPr lang="en-US" dirty="0"/>
-          </a:p>
-        </p:txBody>
-      </p:sp>
-      <p:sp>
-        <p:nvSpPr>
-          <p:cNvPr id="3" name="Content Placeholder 2"/>
-          <p:cNvSpPr>
-            <a:spLocks noGrp="1"/>
-          </p:cNvSpPr>
-          <p:nvPr>
-            <p:ph idx="1"/>
-          </p:nvPr>
-        </p:nvSpPr>
-        <p:spPr/>
-        <p:txBody>
-          <a:bodyPr/>
-          <a:lstStyle/>
-          <a:p>
-            <a:r>
-              <a:rPr lang="en-US" dirty="0" smtClean="0"/>
-              <a:t>Client calls factory to get flyweight object</a:t>
-            </a:r>
-          </a:p>
-          <a:p>
-            <a:r>
-              <a:rPr lang="en-US" dirty="0" smtClean="0"/>
-              <a:t>Factory checks pool to determine if object exists</a:t>
-            </a:r>
-          </a:p>
-          <a:p>
-            <a:pPr lvl="1"/>
-            <a:r>
-              <a:rPr lang="en-US" dirty="0" smtClean="0"/>
-              <a:t>If so factor returns object</a:t>
-            </a:r>
-          </a:p>
-          <a:p>
-            <a:pPr lvl="1"/>
-            <a:r>
-              <a:rPr lang="en-US" dirty="0" smtClean="0"/>
-              <a:t>Otherwise factory creates object adds it to the pool and returns it</a:t>
-            </a:r>
-          </a:p>
-          <a:p>
-            <a:pPr lvl="1"/>
-            <a:r>
-              <a:rPr lang="en-US" dirty="0" smtClean="0"/>
-              <a:t>Flyweight maintains shared internal state and provides methods to manipulate varying external state </a:t>
-            </a:r>
-            <a:endParaRPr lang="en-US" dirty="0"/>
-          </a:p>
-        </p:txBody>
-      </p:sp>
-    </p:spTree>
-    <p:extLst>
-      <p:ext uri="{BB962C8B-B14F-4D97-AF65-F5344CB8AC3E}">
-        <p14:creationId xmlns:p14="http://schemas.microsoft.com/office/powerpoint/2010/main" val="1716789449"/>
-      </p:ext>
-    </p:extLst>
-  </p:cSld>
-  <p:clrMapOvr>
-    <a:masterClrMapping/>
-  </p:clrMapOvr>
-</p:sld>
-</file>
-
-<file path=ppt/slides/slide21.xml><?xml version="1.0" encoding="utf-8"?>
 <p:sld xmlns:a="http://schemas.openxmlformats.org/drawingml/2006/main" xmlns:r="http://schemas.openxmlformats.org/officeDocument/2006/relationships" xmlns:p="http://schemas.openxmlformats.org/presentationml/2006/main">
   <p:cSld>
     <p:spTree>
@@ -5193,6 +5560,13 @@
   <p:clrMapOvr>
     <a:masterClrMapping/>
   </p:clrMapOvr>
+  <p:timing>
+    <p:tnLst>
+      <p:par>
+        <p:cTn id="1" dur="indefinite" restart="never" nodeType="tmRoot"/>
+      </p:par>
+    </p:tnLst>
+  </p:timing>
 </p:sld>
 </file>
 
@@ -5282,6 +5656,13 @@
   <p:clrMapOvr>
     <a:masterClrMapping/>
   </p:clrMapOvr>
+  <p:timing>
+    <p:tnLst>
+      <p:par>
+        <p:cTn id="1" dur="indefinite" restart="never" nodeType="tmRoot"/>
+      </p:par>
+    </p:tnLst>
+  </p:timing>
 </p:sld>
 </file>
 
@@ -5604,6 +5985,13 @@
   <p:clrMapOvr>
     <a:masterClrMapping/>
   </p:clrMapOvr>
+  <p:timing>
+    <p:tnLst>
+      <p:par>
+        <p:cTn id="1" dur="indefinite" restart="never" nodeType="tmRoot"/>
+      </p:par>
+    </p:tnLst>
+  </p:timing>
 </p:sld>
 </file>
 
@@ -5666,27 +6054,39 @@
           <a:p>
             <a:r>
               <a:rPr lang="en-US" dirty="0" smtClean="0"/>
-              <a:t>allow the user to specify a recipient by phone number, through Contacts</a:t>
-            </a:r>
-          </a:p>
-          <a:p>
-            <a:r>
-              <a:rPr lang="en-US" dirty="0" smtClean="0"/>
-              <a:t>always use the users current </a:t>
-            </a:r>
-            <a:r>
-              <a:rPr lang="en-US" dirty="0" err="1" smtClean="0"/>
-              <a:t>gps</a:t>
-            </a:r>
-            <a:r>
-              <a:rPr lang="en-US" dirty="0" smtClean="0"/>
-              <a:t> location as the start point</a:t>
-            </a:r>
-          </a:p>
-          <a:p>
-            <a:r>
-              <a:rPr lang="en-US" dirty="0" smtClean="0"/>
-              <a:t>allow the user to specify an End location, by address</a:t>
+              <a:t>Allow </a:t>
+            </a:r>
+            <a:r>
+              <a:rPr lang="en-US" dirty="0" smtClean="0"/>
+              <a:t>the user to specify a recipient by phone number, through Contacts</a:t>
+            </a:r>
+          </a:p>
+          <a:p>
+            <a:r>
+              <a:rPr lang="en-US" dirty="0" smtClean="0"/>
+              <a:t>Always </a:t>
+            </a:r>
+            <a:r>
+              <a:rPr lang="en-US" dirty="0" smtClean="0"/>
+              <a:t>use the users current </a:t>
+            </a:r>
+            <a:r>
+              <a:rPr lang="en-US" dirty="0" smtClean="0"/>
+              <a:t>GPS location </a:t>
+            </a:r>
+            <a:r>
+              <a:rPr lang="en-US" dirty="0" smtClean="0"/>
+              <a:t>as the start point</a:t>
+            </a:r>
+          </a:p>
+          <a:p>
+            <a:r>
+              <a:rPr lang="en-US" dirty="0" smtClean="0"/>
+              <a:t>Allow </a:t>
+            </a:r>
+            <a:r>
+              <a:rPr lang="en-US" dirty="0" smtClean="0"/>
+              <a:t>the user to specify an End location, by address</a:t>
             </a:r>
           </a:p>
           <a:p>
@@ -5822,6 +6222,13 @@
   <p:clrMapOvr>
     <a:masterClrMapping/>
   </p:clrMapOvr>
+  <p:timing>
+    <p:tnLst>
+      <p:par>
+        <p:cTn id="1" dur="indefinite" restart="never" nodeType="tmRoot"/>
+      </p:par>
+    </p:tnLst>
+  </p:timing>
 </p:sld>
 </file>
 
@@ -5964,6 +6371,13 @@
   <p:clrMapOvr>
     <a:masterClrMapping/>
   </p:clrMapOvr>
+  <p:timing>
+    <p:tnLst>
+      <p:par>
+        <p:cTn id="1" dur="indefinite" restart="never" nodeType="tmRoot"/>
+      </p:par>
+    </p:tnLst>
+  </p:timing>
 </p:sld>
 </file>
 
@@ -6137,6 +6551,13 @@
   <p:clrMapOvr>
     <a:masterClrMapping/>
   </p:clrMapOvr>
+  <p:timing>
+    <p:tnLst>
+      <p:par>
+        <p:cTn id="1" dur="indefinite" restart="never" nodeType="tmRoot"/>
+      </p:par>
+    </p:tnLst>
+  </p:timing>
 </p:sld>
 </file>
 
@@ -6318,6 +6739,13 @@
   <p:clrMapOvr>
     <a:masterClrMapping/>
   </p:clrMapOvr>
+  <p:timing>
+    <p:tnLst>
+      <p:par>
+        <p:cTn id="1" dur="indefinite" restart="never" nodeType="tmRoot"/>
+      </p:par>
+    </p:tnLst>
+  </p:timing>
 </p:sld>
 </file>
 

</xml_diff>